<commit_message>
checkpoint for video style transfer
</commit_message>
<xml_diff>
--- a/video-style-transfer/resources/model.pptx
+++ b/video-style-transfer/resources/model.pptx
@@ -104,6 +104,11 @@
       </a:defRPr>
     </a:lvl9pPr>
   </p:defaultTextStyle>
+  <p:extLst>
+    <p:ext uri="{EFAFB233-063F-42B5-8137-9DF3F51BA10A}">
+      <p15:sldGuideLst xmlns:p15="http://schemas.microsoft.com/office/powerpoint/2012/main"/>
+    </p:ext>
+  </p:extLst>
 </p:presentation>
 </file>
 
@@ -254,7 +259,7 @@
           <a:p>
             <a:fld id="{1AE17E3E-A3CD-4E73-A96D-0E741836FFD0}" type="datetimeFigureOut">
               <a:rPr lang="en-US" smtClean="0"/>
-              <a:t>3/19/2020</a:t>
+              <a:t>3/27/2020</a:t>
             </a:fld>
             <a:endParaRPr lang="en-US"/>
           </a:p>
@@ -452,7 +457,7 @@
           <a:p>
             <a:fld id="{1AE17E3E-A3CD-4E73-A96D-0E741836FFD0}" type="datetimeFigureOut">
               <a:rPr lang="en-US" smtClean="0"/>
-              <a:t>3/19/2020</a:t>
+              <a:t>3/27/2020</a:t>
             </a:fld>
             <a:endParaRPr lang="en-US"/>
           </a:p>
@@ -660,7 +665,7 @@
           <a:p>
             <a:fld id="{1AE17E3E-A3CD-4E73-A96D-0E741836FFD0}" type="datetimeFigureOut">
               <a:rPr lang="en-US" smtClean="0"/>
-              <a:t>3/19/2020</a:t>
+              <a:t>3/27/2020</a:t>
             </a:fld>
             <a:endParaRPr lang="en-US"/>
           </a:p>
@@ -858,7 +863,7 @@
           <a:p>
             <a:fld id="{1AE17E3E-A3CD-4E73-A96D-0E741836FFD0}" type="datetimeFigureOut">
               <a:rPr lang="en-US" smtClean="0"/>
-              <a:t>3/19/2020</a:t>
+              <a:t>3/27/2020</a:t>
             </a:fld>
             <a:endParaRPr lang="en-US"/>
           </a:p>
@@ -1133,7 +1138,7 @@
           <a:p>
             <a:fld id="{1AE17E3E-A3CD-4E73-A96D-0E741836FFD0}" type="datetimeFigureOut">
               <a:rPr lang="en-US" smtClean="0"/>
-              <a:t>3/19/2020</a:t>
+              <a:t>3/27/2020</a:t>
             </a:fld>
             <a:endParaRPr lang="en-US"/>
           </a:p>
@@ -1398,7 +1403,7 @@
           <a:p>
             <a:fld id="{1AE17E3E-A3CD-4E73-A96D-0E741836FFD0}" type="datetimeFigureOut">
               <a:rPr lang="en-US" smtClean="0"/>
-              <a:t>3/19/2020</a:t>
+              <a:t>3/27/2020</a:t>
             </a:fld>
             <a:endParaRPr lang="en-US"/>
           </a:p>
@@ -1810,7 +1815,7 @@
           <a:p>
             <a:fld id="{1AE17E3E-A3CD-4E73-A96D-0E741836FFD0}" type="datetimeFigureOut">
               <a:rPr lang="en-US" smtClean="0"/>
-              <a:t>3/19/2020</a:t>
+              <a:t>3/27/2020</a:t>
             </a:fld>
             <a:endParaRPr lang="en-US"/>
           </a:p>
@@ -1951,7 +1956,7 @@
           <a:p>
             <a:fld id="{1AE17E3E-A3CD-4E73-A96D-0E741836FFD0}" type="datetimeFigureOut">
               <a:rPr lang="en-US" smtClean="0"/>
-              <a:t>3/19/2020</a:t>
+              <a:t>3/27/2020</a:t>
             </a:fld>
             <a:endParaRPr lang="en-US"/>
           </a:p>
@@ -2064,7 +2069,7 @@
           <a:p>
             <a:fld id="{1AE17E3E-A3CD-4E73-A96D-0E741836FFD0}" type="datetimeFigureOut">
               <a:rPr lang="en-US" smtClean="0"/>
-              <a:t>3/19/2020</a:t>
+              <a:t>3/27/2020</a:t>
             </a:fld>
             <a:endParaRPr lang="en-US"/>
           </a:p>
@@ -2375,7 +2380,7 @@
           <a:p>
             <a:fld id="{1AE17E3E-A3CD-4E73-A96D-0E741836FFD0}" type="datetimeFigureOut">
               <a:rPr lang="en-US" smtClean="0"/>
-              <a:t>3/19/2020</a:t>
+              <a:t>3/27/2020</a:t>
             </a:fld>
             <a:endParaRPr lang="en-US"/>
           </a:p>
@@ -2663,7 +2668,7 @@
           <a:p>
             <a:fld id="{1AE17E3E-A3CD-4E73-A96D-0E741836FFD0}" type="datetimeFigureOut">
               <a:rPr lang="en-US" smtClean="0"/>
-              <a:t>3/19/2020</a:t>
+              <a:t>3/27/2020</a:t>
             </a:fld>
             <a:endParaRPr lang="en-US"/>
           </a:p>
@@ -2904,7 +2909,7 @@
           <a:p>
             <a:fld id="{1AE17E3E-A3CD-4E73-A96D-0E741836FFD0}" type="datetimeFigureOut">
               <a:rPr lang="en-US" smtClean="0"/>
-              <a:t>3/19/2020</a:t>
+              <a:t>3/27/2020</a:t>
             </a:fld>
             <a:endParaRPr lang="en-US"/>
           </a:p>
@@ -4653,11 +4658,11 @@
         <p:spPr>
           <a:xfrm>
             <a:off x="7717781" y="3469639"/>
-            <a:ext cx="3600459" cy="634471"/>
+            <a:ext cx="2409199" cy="634471"/>
           </a:xfrm>
           <a:prstGeom prst="bentConnector3">
             <a:avLst>
-              <a:gd name="adj1" fmla="val 100000"/>
+              <a:gd name="adj1" fmla="val 99973"/>
             </a:avLst>
           </a:prstGeom>
           <a:ln w="28575">
@@ -4697,11 +4702,11 @@
         <p:spPr>
           <a:xfrm flipV="1">
             <a:off x="7722597" y="3702076"/>
-            <a:ext cx="3473088" cy="1281057"/>
+            <a:ext cx="2242458" cy="1281057"/>
           </a:xfrm>
           <a:prstGeom prst="bentConnector3">
             <a:avLst>
-              <a:gd name="adj1" fmla="val 18114"/>
+              <a:gd name="adj1" fmla="val 19757"/>
             </a:avLst>
           </a:prstGeom>
           <a:ln w="28575">
@@ -4741,7 +4746,7 @@
         </p:nvCxnSpPr>
         <p:spPr>
           <a:xfrm>
-            <a:off x="11181715" y="3702076"/>
+            <a:off x="9951720" y="3702076"/>
             <a:ext cx="0" cy="402034"/>
           </a:xfrm>
           <a:prstGeom prst="straightConnector1">

</xml_diff>